<commit_message>
About to load a bunny!
</commit_message>
<xml_diff>
--- a/Day2Day/Day_1 (Tues, June 28th, 2022)/INFO3111S22_W01_Course_Intro (long and boring PPT).pptx
+++ b/Day2Day/Day_1 (Tues, June 28th, 2022)/INFO3111S22_W01_Course_Intro (long and boring PPT).pptx
@@ -5,7 +5,7 @@
     <p:sldMasterId id="2147483648" r:id="rId1"/>
   </p:sldMasterIdLst>
   <p:notesMasterIdLst>
-    <p:notesMasterId r:id="rId47"/>
+    <p:notesMasterId r:id="rId49"/>
   </p:notesMasterIdLst>
   <p:sldIdLst>
     <p:sldId id="305" r:id="rId2"/>
@@ -49,10 +49,12 @@
     <p:sldId id="277" r:id="rId40"/>
     <p:sldId id="271" r:id="rId41"/>
     <p:sldId id="304" r:id="rId42"/>
-    <p:sldId id="322" r:id="rId43"/>
-    <p:sldId id="323" r:id="rId44"/>
-    <p:sldId id="324" r:id="rId45"/>
-    <p:sldId id="325" r:id="rId46"/>
+    <p:sldId id="326" r:id="rId43"/>
+    <p:sldId id="327" r:id="rId44"/>
+    <p:sldId id="322" r:id="rId45"/>
+    <p:sldId id="323" r:id="rId46"/>
+    <p:sldId id="324" r:id="rId47"/>
+    <p:sldId id="325" r:id="rId48"/>
   </p:sldIdLst>
   <p:sldSz cx="9144000" cy="5143500" type="screen16x9"/>
   <p:notesSz cx="6858000" cy="9144000"/>
@@ -354,7 +356,7 @@
               <a:pPr>
                 <a:defRPr/>
               </a:pPr>
-              <a:t>6/28/2022</a:t>
+              <a:t>7/5/2022</a:t>
             </a:fld>
             <a:endParaRPr lang="en-US"/>
           </a:p>
@@ -1488,7 +1490,7 @@
               <a:pPr>
                 <a:defRPr/>
               </a:pPr>
-              <a:t>6/28/2022</a:t>
+              <a:t>7/5/2022</a:t>
             </a:fld>
             <a:endParaRPr lang="en-US"/>
           </a:p>
@@ -1612,7 +1614,7 @@
               <a:pPr>
                 <a:defRPr/>
               </a:pPr>
-              <a:t>6/28/2022</a:t>
+              <a:t>7/5/2022</a:t>
             </a:fld>
             <a:endParaRPr lang="en-US" dirty="0"/>
           </a:p>
@@ -1802,7 +1804,7 @@
               <a:pPr>
                 <a:defRPr/>
               </a:pPr>
-              <a:t>6/28/2022</a:t>
+              <a:t>7/5/2022</a:t>
             </a:fld>
             <a:endParaRPr lang="en-US" dirty="0"/>
           </a:p>
@@ -2056,7 +2058,7 @@
               <a:pPr>
                 <a:defRPr/>
               </a:pPr>
-              <a:t>6/28/2022</a:t>
+              <a:t>7/5/2022</a:t>
             </a:fld>
             <a:endParaRPr lang="en-US"/>
           </a:p>
@@ -2362,7 +2364,7 @@
               <a:pPr>
                 <a:defRPr/>
               </a:pPr>
-              <a:t>6/28/2022</a:t>
+              <a:t>7/5/2022</a:t>
             </a:fld>
             <a:endParaRPr lang="en-US"/>
           </a:p>
@@ -3317,7 +3319,7 @@
               <a:pPr>
                 <a:defRPr/>
               </a:pPr>
-              <a:t>6/28/2022</a:t>
+              <a:t>7/5/2022</a:t>
             </a:fld>
             <a:endParaRPr lang="en-US"/>
           </a:p>
@@ -3469,7 +3471,7 @@
               <a:pPr>
                 <a:defRPr/>
               </a:pPr>
-              <a:t>6/28/2022</a:t>
+              <a:t>7/5/2022</a:t>
             </a:fld>
             <a:endParaRPr lang="en-US" dirty="0"/>
           </a:p>
@@ -3587,7 +3589,7 @@
               <a:pPr>
                 <a:defRPr/>
               </a:pPr>
-              <a:t>6/28/2022</a:t>
+              <a:t>7/5/2022</a:t>
             </a:fld>
             <a:endParaRPr lang="en-US"/>
           </a:p>
@@ -3865,7 +3867,7 @@
               <a:pPr>
                 <a:defRPr/>
               </a:pPr>
-              <a:t>6/28/2022</a:t>
+              <a:t>7/5/2022</a:t>
             </a:fld>
             <a:endParaRPr lang="en-US"/>
           </a:p>
@@ -4616,7 +4618,7 @@
               <a:pPr>
                 <a:defRPr/>
               </a:pPr>
-              <a:t>6/28/2022</a:t>
+              <a:t>7/5/2022</a:t>
             </a:fld>
             <a:endParaRPr lang="en-US"/>
           </a:p>
@@ -4866,7 +4868,7 @@
               <a:pPr>
                 <a:defRPr/>
               </a:pPr>
-              <a:t>6/28/2022</a:t>
+              <a:t>7/5/2022</a:t>
             </a:fld>
             <a:endParaRPr lang="en-US" dirty="0"/>
           </a:p>
@@ -30532,6 +30534,773 @@
       </p:grpSpPr>
       <p:sp>
         <p:nvSpPr>
+          <p:cNvPr id="2" name="Rectangle: Rounded Corners 1">
+            <a:extLst>
+              <a:ext uri="{FF2B5EF4-FFF2-40B4-BE49-F238E27FC236}">
+                <a16:creationId xmlns:a16="http://schemas.microsoft.com/office/drawing/2014/main" id="{8AF543E8-848A-48B7-C86B-CABBF770EC40}"/>
+              </a:ext>
+            </a:extLst>
+          </p:cNvPr>
+          <p:cNvSpPr/>
+          <p:nvPr/>
+        </p:nvSpPr>
+        <p:spPr>
+          <a:xfrm>
+            <a:off x="467544" y="843558"/>
+            <a:ext cx="1656184" cy="720080"/>
+          </a:xfrm>
+          <a:prstGeom prst="roundRect">
+            <a:avLst/>
+          </a:prstGeom>
+        </p:spPr>
+        <p:style>
+          <a:lnRef idx="2">
+            <a:schemeClr val="accent1">
+              <a:shade val="50000"/>
+            </a:schemeClr>
+          </a:lnRef>
+          <a:fillRef idx="1">
+            <a:schemeClr val="accent1"/>
+          </a:fillRef>
+          <a:effectRef idx="0">
+            <a:schemeClr val="accent1"/>
+          </a:effectRef>
+          <a:fontRef idx="minor">
+            <a:schemeClr val="lt1"/>
+          </a:fontRef>
+        </p:style>
+        <p:txBody>
+          <a:bodyPr rtlCol="0" anchor="ctr"/>
+          <a:lstStyle/>
+          <a:p>
+            <a:pPr algn="ctr"/>
+            <a:r>
+              <a:rPr lang="en-US" dirty="0"/>
+              <a:t>CPU 4.0Gx16</a:t>
+            </a:r>
+            <a:endParaRPr lang="en-CA" dirty="0"/>
+          </a:p>
+        </p:txBody>
+      </p:sp>
+      <p:sp>
+        <p:nvSpPr>
+          <p:cNvPr id="3" name="Rectangle: Rounded Corners 2">
+            <a:extLst>
+              <a:ext uri="{FF2B5EF4-FFF2-40B4-BE49-F238E27FC236}">
+                <a16:creationId xmlns:a16="http://schemas.microsoft.com/office/drawing/2014/main" id="{4F737B90-70DF-0196-B3CA-CE42E35438A8}"/>
+              </a:ext>
+            </a:extLst>
+          </p:cNvPr>
+          <p:cNvSpPr/>
+          <p:nvPr/>
+        </p:nvSpPr>
+        <p:spPr>
+          <a:xfrm>
+            <a:off x="353815" y="2313806"/>
+            <a:ext cx="1867718" cy="720080"/>
+          </a:xfrm>
+          <a:prstGeom prst="roundRect">
+            <a:avLst/>
+          </a:prstGeom>
+        </p:spPr>
+        <p:style>
+          <a:lnRef idx="2">
+            <a:schemeClr val="accent1">
+              <a:shade val="50000"/>
+            </a:schemeClr>
+          </a:lnRef>
+          <a:fillRef idx="1">
+            <a:schemeClr val="accent1"/>
+          </a:fillRef>
+          <a:effectRef idx="0">
+            <a:schemeClr val="accent1"/>
+          </a:effectRef>
+          <a:fontRef idx="minor">
+            <a:schemeClr val="lt1"/>
+          </a:fontRef>
+        </p:style>
+        <p:txBody>
+          <a:bodyPr rtlCol="0" anchor="ctr"/>
+          <a:lstStyle/>
+          <a:p>
+            <a:pPr algn="ctr"/>
+            <a:r>
+              <a:rPr lang="en-US" dirty="0"/>
+              <a:t>RAM 32G</a:t>
+            </a:r>
+            <a:endParaRPr lang="en-CA" dirty="0"/>
+          </a:p>
+        </p:txBody>
+      </p:sp>
+      <p:sp>
+        <p:nvSpPr>
+          <p:cNvPr id="4" name="Arrow: Up-Down 3">
+            <a:extLst>
+              <a:ext uri="{FF2B5EF4-FFF2-40B4-BE49-F238E27FC236}">
+                <a16:creationId xmlns:a16="http://schemas.microsoft.com/office/drawing/2014/main" id="{FF4184F7-A774-D251-3547-E9CBD09893EE}"/>
+              </a:ext>
+            </a:extLst>
+          </p:cNvPr>
+          <p:cNvSpPr/>
+          <p:nvPr/>
+        </p:nvSpPr>
+        <p:spPr>
+          <a:xfrm>
+            <a:off x="971600" y="1563638"/>
+            <a:ext cx="648072" cy="720080"/>
+          </a:xfrm>
+          <a:prstGeom prst="upDownArrow">
+            <a:avLst>
+              <a:gd name="adj1" fmla="val 50000"/>
+              <a:gd name="adj2" fmla="val 26484"/>
+            </a:avLst>
+          </a:prstGeom>
+        </p:spPr>
+        <p:style>
+          <a:lnRef idx="2">
+            <a:schemeClr val="accent1">
+              <a:shade val="50000"/>
+            </a:schemeClr>
+          </a:lnRef>
+          <a:fillRef idx="1">
+            <a:schemeClr val="accent1"/>
+          </a:fillRef>
+          <a:effectRef idx="0">
+            <a:schemeClr val="accent1"/>
+          </a:effectRef>
+          <a:fontRef idx="minor">
+            <a:schemeClr val="lt1"/>
+          </a:fontRef>
+        </p:style>
+        <p:txBody>
+          <a:bodyPr rtlCol="0" anchor="ctr"/>
+          <a:lstStyle/>
+          <a:p>
+            <a:pPr algn="ctr"/>
+            <a:endParaRPr lang="en-CA"/>
+          </a:p>
+        </p:txBody>
+      </p:sp>
+      <p:sp>
+        <p:nvSpPr>
+          <p:cNvPr id="5" name="Rectangle: Rounded Corners 4">
+            <a:extLst>
+              <a:ext uri="{FF2B5EF4-FFF2-40B4-BE49-F238E27FC236}">
+                <a16:creationId xmlns:a16="http://schemas.microsoft.com/office/drawing/2014/main" id="{43E90C28-1CE6-C07F-0AF2-DC52F4CA3FC2}"/>
+              </a:ext>
+            </a:extLst>
+          </p:cNvPr>
+          <p:cNvSpPr/>
+          <p:nvPr/>
+        </p:nvSpPr>
+        <p:spPr>
+          <a:xfrm>
+            <a:off x="466230" y="3969990"/>
+            <a:ext cx="1656184" cy="720080"/>
+          </a:xfrm>
+          <a:prstGeom prst="roundRect">
+            <a:avLst/>
+          </a:prstGeom>
+        </p:spPr>
+        <p:style>
+          <a:lnRef idx="2">
+            <a:schemeClr val="accent1">
+              <a:shade val="50000"/>
+            </a:schemeClr>
+          </a:lnRef>
+          <a:fillRef idx="1">
+            <a:schemeClr val="accent1"/>
+          </a:fillRef>
+          <a:effectRef idx="0">
+            <a:schemeClr val="accent1"/>
+          </a:effectRef>
+          <a:fontRef idx="minor">
+            <a:schemeClr val="lt1"/>
+          </a:fontRef>
+        </p:style>
+        <p:txBody>
+          <a:bodyPr rtlCol="0" anchor="ctr"/>
+          <a:lstStyle/>
+          <a:p>
+            <a:pPr algn="ctr"/>
+            <a:r>
+              <a:rPr lang="en-US" dirty="0"/>
+              <a:t>HDD</a:t>
+            </a:r>
+            <a:endParaRPr lang="en-CA" dirty="0"/>
+          </a:p>
+        </p:txBody>
+      </p:sp>
+      <p:sp>
+        <p:nvSpPr>
+          <p:cNvPr id="6" name="Arrow: Up-Down 5">
+            <a:extLst>
+              <a:ext uri="{FF2B5EF4-FFF2-40B4-BE49-F238E27FC236}">
+                <a16:creationId xmlns:a16="http://schemas.microsoft.com/office/drawing/2014/main" id="{E716ED85-3AE2-2E40-993D-E001CB87D92E}"/>
+              </a:ext>
+            </a:extLst>
+          </p:cNvPr>
+          <p:cNvSpPr/>
+          <p:nvPr/>
+        </p:nvSpPr>
+        <p:spPr>
+          <a:xfrm>
+            <a:off x="963638" y="3033886"/>
+            <a:ext cx="648072" cy="906016"/>
+          </a:xfrm>
+          <a:prstGeom prst="upDownArrow">
+            <a:avLst>
+              <a:gd name="adj1" fmla="val 50000"/>
+              <a:gd name="adj2" fmla="val 26484"/>
+            </a:avLst>
+          </a:prstGeom>
+        </p:spPr>
+        <p:style>
+          <a:lnRef idx="2">
+            <a:schemeClr val="accent1">
+              <a:shade val="50000"/>
+            </a:schemeClr>
+          </a:lnRef>
+          <a:fillRef idx="1">
+            <a:schemeClr val="accent1"/>
+          </a:fillRef>
+          <a:effectRef idx="0">
+            <a:schemeClr val="accent1"/>
+          </a:effectRef>
+          <a:fontRef idx="minor">
+            <a:schemeClr val="lt1"/>
+          </a:fontRef>
+        </p:style>
+        <p:txBody>
+          <a:bodyPr rtlCol="0" anchor="ctr"/>
+          <a:lstStyle/>
+          <a:p>
+            <a:pPr algn="ctr"/>
+            <a:r>
+              <a:rPr lang="en-US" sz="1050" dirty="0"/>
+              <a:t>CODE</a:t>
+            </a:r>
+            <a:endParaRPr lang="en-CA" dirty="0"/>
+          </a:p>
+        </p:txBody>
+      </p:sp>
+      <p:sp>
+        <p:nvSpPr>
+          <p:cNvPr id="7" name="Rectangle: Rounded Corners 6">
+            <a:extLst>
+              <a:ext uri="{FF2B5EF4-FFF2-40B4-BE49-F238E27FC236}">
+                <a16:creationId xmlns:a16="http://schemas.microsoft.com/office/drawing/2014/main" id="{B924CF71-37E5-7DA2-B6BB-FA5A62A53D11}"/>
+              </a:ext>
+            </a:extLst>
+          </p:cNvPr>
+          <p:cNvSpPr/>
+          <p:nvPr/>
+        </p:nvSpPr>
+        <p:spPr>
+          <a:xfrm>
+            <a:off x="1907704" y="918456"/>
+            <a:ext cx="1008112" cy="323366"/>
+          </a:xfrm>
+          <a:prstGeom prst="roundRect">
+            <a:avLst/>
+          </a:prstGeom>
+        </p:spPr>
+        <p:style>
+          <a:lnRef idx="2">
+            <a:schemeClr val="accent1">
+              <a:shade val="50000"/>
+            </a:schemeClr>
+          </a:lnRef>
+          <a:fillRef idx="1">
+            <a:schemeClr val="accent1"/>
+          </a:fillRef>
+          <a:effectRef idx="0">
+            <a:schemeClr val="accent1"/>
+          </a:effectRef>
+          <a:fontRef idx="minor">
+            <a:schemeClr val="lt1"/>
+          </a:fontRef>
+        </p:style>
+        <p:txBody>
+          <a:bodyPr rtlCol="0" anchor="ctr"/>
+          <a:lstStyle/>
+          <a:p>
+            <a:pPr algn="ctr"/>
+            <a:r>
+              <a:rPr lang="en-US" sz="1400" dirty="0"/>
+              <a:t>32-1000</a:t>
+            </a:r>
+            <a:endParaRPr lang="en-CA" sz="1400" dirty="0"/>
+          </a:p>
+        </p:txBody>
+      </p:sp>
+      <p:sp>
+        <p:nvSpPr>
+          <p:cNvPr id="8" name="Rectangle: Rounded Corners 7">
+            <a:extLst>
+              <a:ext uri="{FF2B5EF4-FFF2-40B4-BE49-F238E27FC236}">
+                <a16:creationId xmlns:a16="http://schemas.microsoft.com/office/drawing/2014/main" id="{DE86D9BA-4DB7-DB17-3F04-03B28C575BAF}"/>
+              </a:ext>
+            </a:extLst>
+          </p:cNvPr>
+          <p:cNvSpPr/>
+          <p:nvPr/>
+        </p:nvSpPr>
+        <p:spPr>
+          <a:xfrm>
+            <a:off x="4344268" y="903412"/>
+            <a:ext cx="2437310" cy="720080"/>
+          </a:xfrm>
+          <a:prstGeom prst="roundRect">
+            <a:avLst/>
+          </a:prstGeom>
+        </p:spPr>
+        <p:style>
+          <a:lnRef idx="2">
+            <a:schemeClr val="accent1">
+              <a:shade val="50000"/>
+            </a:schemeClr>
+          </a:lnRef>
+          <a:fillRef idx="1">
+            <a:schemeClr val="accent1"/>
+          </a:fillRef>
+          <a:effectRef idx="0">
+            <a:schemeClr val="accent1"/>
+          </a:effectRef>
+          <a:fontRef idx="minor">
+            <a:schemeClr val="lt1"/>
+          </a:fontRef>
+        </p:style>
+        <p:txBody>
+          <a:bodyPr rtlCol="0" anchor="ctr"/>
+          <a:lstStyle/>
+          <a:p>
+            <a:pPr algn="ctr"/>
+            <a:r>
+              <a:rPr lang="en-US" dirty="0"/>
+              <a:t>GPU : 6144 Core</a:t>
+            </a:r>
+            <a:endParaRPr lang="en-CA" dirty="0"/>
+          </a:p>
+        </p:txBody>
+      </p:sp>
+      <p:sp>
+        <p:nvSpPr>
+          <p:cNvPr id="9" name="Rectangle: Rounded Corners 8">
+            <a:extLst>
+              <a:ext uri="{FF2B5EF4-FFF2-40B4-BE49-F238E27FC236}">
+                <a16:creationId xmlns:a16="http://schemas.microsoft.com/office/drawing/2014/main" id="{A3CB8FE8-E4B1-3417-96BC-59508106B601}"/>
+              </a:ext>
+            </a:extLst>
+          </p:cNvPr>
+          <p:cNvSpPr/>
+          <p:nvPr/>
+        </p:nvSpPr>
+        <p:spPr>
+          <a:xfrm>
+            <a:off x="4692029" y="2313806"/>
+            <a:ext cx="1867718" cy="720080"/>
+          </a:xfrm>
+          <a:prstGeom prst="roundRect">
+            <a:avLst/>
+          </a:prstGeom>
+        </p:spPr>
+        <p:style>
+          <a:lnRef idx="2">
+            <a:schemeClr val="accent1">
+              <a:shade val="50000"/>
+            </a:schemeClr>
+          </a:lnRef>
+          <a:fillRef idx="1">
+            <a:schemeClr val="accent1"/>
+          </a:fillRef>
+          <a:effectRef idx="0">
+            <a:schemeClr val="accent1"/>
+          </a:effectRef>
+          <a:fontRef idx="minor">
+            <a:schemeClr val="lt1"/>
+          </a:fontRef>
+        </p:style>
+        <p:txBody>
+          <a:bodyPr rtlCol="0" anchor="ctr"/>
+          <a:lstStyle/>
+          <a:p>
+            <a:pPr algn="ctr"/>
+            <a:r>
+              <a:rPr lang="en-US" dirty="0"/>
+              <a:t>RAM 8G</a:t>
+            </a:r>
+            <a:endParaRPr lang="en-CA" dirty="0"/>
+          </a:p>
+        </p:txBody>
+      </p:sp>
+      <p:sp>
+        <p:nvSpPr>
+          <p:cNvPr id="10" name="Arrow: Up-Down 9">
+            <a:extLst>
+              <a:ext uri="{FF2B5EF4-FFF2-40B4-BE49-F238E27FC236}">
+                <a16:creationId xmlns:a16="http://schemas.microsoft.com/office/drawing/2014/main" id="{62DA1621-8500-691F-600A-8B14480EAA75}"/>
+              </a:ext>
+            </a:extLst>
+          </p:cNvPr>
+          <p:cNvSpPr/>
+          <p:nvPr/>
+        </p:nvSpPr>
+        <p:spPr>
+          <a:xfrm>
+            <a:off x="5292080" y="1638536"/>
+            <a:ext cx="648072" cy="720080"/>
+          </a:xfrm>
+          <a:prstGeom prst="upDownArrow">
+            <a:avLst>
+              <a:gd name="adj1" fmla="val 50000"/>
+              <a:gd name="adj2" fmla="val 26484"/>
+            </a:avLst>
+          </a:prstGeom>
+        </p:spPr>
+        <p:style>
+          <a:lnRef idx="2">
+            <a:schemeClr val="accent1">
+              <a:shade val="50000"/>
+            </a:schemeClr>
+          </a:lnRef>
+          <a:fillRef idx="1">
+            <a:schemeClr val="accent1"/>
+          </a:fillRef>
+          <a:effectRef idx="0">
+            <a:schemeClr val="accent1"/>
+          </a:effectRef>
+          <a:fontRef idx="minor">
+            <a:schemeClr val="lt1"/>
+          </a:fontRef>
+        </p:style>
+        <p:txBody>
+          <a:bodyPr rtlCol="0" anchor="ctr"/>
+          <a:lstStyle/>
+          <a:p>
+            <a:pPr algn="ctr"/>
+            <a:r>
+              <a:rPr lang="en-US" sz="1050" dirty="0"/>
+              <a:t>Code</a:t>
+            </a:r>
+            <a:endParaRPr lang="en-CA" dirty="0"/>
+          </a:p>
+        </p:txBody>
+      </p:sp>
+      <p:sp>
+        <p:nvSpPr>
+          <p:cNvPr id="13" name="Rectangle: Rounded Corners 12">
+            <a:extLst>
+              <a:ext uri="{FF2B5EF4-FFF2-40B4-BE49-F238E27FC236}">
+                <a16:creationId xmlns:a16="http://schemas.microsoft.com/office/drawing/2014/main" id="{6435AFC8-6E94-B69B-F8FE-CAF13DC60998}"/>
+              </a:ext>
+            </a:extLst>
+          </p:cNvPr>
+          <p:cNvSpPr/>
+          <p:nvPr/>
+        </p:nvSpPr>
+        <p:spPr>
+          <a:xfrm>
+            <a:off x="6732240" y="918456"/>
+            <a:ext cx="1440160" cy="390128"/>
+          </a:xfrm>
+          <a:prstGeom prst="roundRect">
+            <a:avLst/>
+          </a:prstGeom>
+        </p:spPr>
+        <p:style>
+          <a:lnRef idx="2">
+            <a:schemeClr val="accent1">
+              <a:shade val="50000"/>
+            </a:schemeClr>
+          </a:lnRef>
+          <a:fillRef idx="1">
+            <a:schemeClr val="accent1"/>
+          </a:fillRef>
+          <a:effectRef idx="0">
+            <a:schemeClr val="accent1"/>
+          </a:effectRef>
+          <a:fontRef idx="minor">
+            <a:schemeClr val="lt1"/>
+          </a:fontRef>
+        </p:style>
+        <p:txBody>
+          <a:bodyPr rtlCol="0" anchor="ctr"/>
+          <a:lstStyle/>
+          <a:p>
+            <a:pPr algn="ctr"/>
+            <a:r>
+              <a:rPr lang="en-US" sz="1400" dirty="0"/>
+              <a:t>65,000 REG</a:t>
+            </a:r>
+            <a:endParaRPr lang="en-CA" sz="1400" dirty="0"/>
+          </a:p>
+        </p:txBody>
+      </p:sp>
+      <p:sp>
+        <p:nvSpPr>
+          <p:cNvPr id="14" name="Arrow: Up-Down 13">
+            <a:extLst>
+              <a:ext uri="{FF2B5EF4-FFF2-40B4-BE49-F238E27FC236}">
+                <a16:creationId xmlns:a16="http://schemas.microsoft.com/office/drawing/2014/main" id="{F87A5F6B-CAC9-0BCD-1C94-B828CC0D18F7}"/>
+              </a:ext>
+            </a:extLst>
+          </p:cNvPr>
+          <p:cNvSpPr/>
+          <p:nvPr/>
+        </p:nvSpPr>
+        <p:spPr>
+          <a:xfrm rot="16200000">
+            <a:off x="3132745" y="1491195"/>
+            <a:ext cx="648072" cy="2437309"/>
+          </a:xfrm>
+          <a:prstGeom prst="upDownArrow">
+            <a:avLst>
+              <a:gd name="adj1" fmla="val 50000"/>
+              <a:gd name="adj2" fmla="val 26484"/>
+            </a:avLst>
+          </a:prstGeom>
+        </p:spPr>
+        <p:style>
+          <a:lnRef idx="2">
+            <a:schemeClr val="accent1">
+              <a:shade val="50000"/>
+            </a:schemeClr>
+          </a:lnRef>
+          <a:fillRef idx="1">
+            <a:schemeClr val="accent1"/>
+          </a:fillRef>
+          <a:effectRef idx="0">
+            <a:schemeClr val="accent1"/>
+          </a:effectRef>
+          <a:fontRef idx="minor">
+            <a:schemeClr val="lt1"/>
+          </a:fontRef>
+        </p:style>
+        <p:txBody>
+          <a:bodyPr rtlCol="0" anchor="ctr"/>
+          <a:lstStyle/>
+          <a:p>
+            <a:pPr algn="ctr"/>
+            <a:r>
+              <a:rPr lang="en-US" sz="1100" dirty="0"/>
+              <a:t>CODE</a:t>
+            </a:r>
+            <a:endParaRPr lang="en-CA" dirty="0"/>
+          </a:p>
+        </p:txBody>
+      </p:sp>
+    </p:spTree>
+    <p:extLst>
+      <p:ext uri="{BB962C8B-B14F-4D97-AF65-F5344CB8AC3E}">
+        <p14:creationId xmlns:p14="http://schemas.microsoft.com/office/powerpoint/2010/main" val="4274447890"/>
+      </p:ext>
+    </p:extLst>
+  </p:cSld>
+  <p:clrMapOvr>
+    <a:masterClrMapping/>
+  </p:clrMapOvr>
+</p:sld>
+</file>
+
+<file path=ppt/slides/slide43.xml><?xml version="1.0" encoding="utf-8"?>
+<p:sld xmlns:a="http://schemas.openxmlformats.org/drawingml/2006/main" xmlns:r="http://schemas.openxmlformats.org/officeDocument/2006/relationships" xmlns:p="http://schemas.openxmlformats.org/presentationml/2006/main">
+  <p:cSld>
+    <p:spTree>
+      <p:nvGrpSpPr>
+        <p:cNvPr id="1" name=""/>
+        <p:cNvGrpSpPr/>
+        <p:nvPr/>
+      </p:nvGrpSpPr>
+      <p:grpSpPr>
+        <a:xfrm>
+          <a:off x="0" y="0"/>
+          <a:ext cx="0" cy="0"/>
+          <a:chOff x="0" y="0"/>
+          <a:chExt cx="0" cy="0"/>
+        </a:xfrm>
+      </p:grpSpPr>
+      <p:sp>
+        <p:nvSpPr>
+          <p:cNvPr id="5" name="Rectangle: Rounded Corners 4">
+            <a:extLst>
+              <a:ext uri="{FF2B5EF4-FFF2-40B4-BE49-F238E27FC236}">
+                <a16:creationId xmlns:a16="http://schemas.microsoft.com/office/drawing/2014/main" id="{43E90C28-1CE6-C07F-0AF2-DC52F4CA3FC2}"/>
+              </a:ext>
+            </a:extLst>
+          </p:cNvPr>
+          <p:cNvSpPr/>
+          <p:nvPr/>
+        </p:nvSpPr>
+        <p:spPr>
+          <a:xfrm>
+            <a:off x="643583" y="3949278"/>
+            <a:ext cx="1656184" cy="720080"/>
+          </a:xfrm>
+          <a:prstGeom prst="roundRect">
+            <a:avLst/>
+          </a:prstGeom>
+        </p:spPr>
+        <p:style>
+          <a:lnRef idx="2">
+            <a:schemeClr val="accent1">
+              <a:shade val="50000"/>
+            </a:schemeClr>
+          </a:lnRef>
+          <a:fillRef idx="1">
+            <a:schemeClr val="accent1"/>
+          </a:fillRef>
+          <a:effectRef idx="0">
+            <a:schemeClr val="accent1"/>
+          </a:effectRef>
+          <a:fontRef idx="minor">
+            <a:schemeClr val="lt1"/>
+          </a:fontRef>
+        </p:style>
+        <p:txBody>
+          <a:bodyPr rtlCol="0" anchor="ctr"/>
+          <a:lstStyle/>
+          <a:p>
+            <a:pPr algn="ctr"/>
+            <a:r>
+              <a:rPr lang="en-US" dirty="0"/>
+              <a:t>Your local copy</a:t>
+            </a:r>
+            <a:endParaRPr lang="en-CA" dirty="0"/>
+          </a:p>
+        </p:txBody>
+      </p:sp>
+      <p:sp>
+        <p:nvSpPr>
+          <p:cNvPr id="6" name="Arrow: Up-Down 5">
+            <a:extLst>
+              <a:ext uri="{FF2B5EF4-FFF2-40B4-BE49-F238E27FC236}">
+                <a16:creationId xmlns:a16="http://schemas.microsoft.com/office/drawing/2014/main" id="{E716ED85-3AE2-2E40-993D-E001CB87D92E}"/>
+              </a:ext>
+            </a:extLst>
+          </p:cNvPr>
+          <p:cNvSpPr/>
+          <p:nvPr/>
+        </p:nvSpPr>
+        <p:spPr>
+          <a:xfrm>
+            <a:off x="1147639" y="1388306"/>
+            <a:ext cx="648072" cy="2520280"/>
+          </a:xfrm>
+          <a:prstGeom prst="upDownArrow">
+            <a:avLst>
+              <a:gd name="adj1" fmla="val 50000"/>
+              <a:gd name="adj2" fmla="val 26484"/>
+            </a:avLst>
+          </a:prstGeom>
+        </p:spPr>
+        <p:style>
+          <a:lnRef idx="2">
+            <a:schemeClr val="accent1">
+              <a:shade val="50000"/>
+            </a:schemeClr>
+          </a:lnRef>
+          <a:fillRef idx="1">
+            <a:schemeClr val="accent1"/>
+          </a:fillRef>
+          <a:effectRef idx="0">
+            <a:schemeClr val="accent1"/>
+          </a:effectRef>
+          <a:fontRef idx="minor">
+            <a:schemeClr val="lt1"/>
+          </a:fontRef>
+        </p:style>
+        <p:txBody>
+          <a:bodyPr rtlCol="0" anchor="ctr"/>
+          <a:lstStyle/>
+          <a:p>
+            <a:pPr algn="ctr"/>
+            <a:endParaRPr lang="en-CA" dirty="0"/>
+          </a:p>
+        </p:txBody>
+      </p:sp>
+      <p:sp>
+        <p:nvSpPr>
+          <p:cNvPr id="15" name="Rectangle: Rounded Corners 14">
+            <a:extLst>
+              <a:ext uri="{FF2B5EF4-FFF2-40B4-BE49-F238E27FC236}">
+                <a16:creationId xmlns:a16="http://schemas.microsoft.com/office/drawing/2014/main" id="{FE5CCEDD-BFFB-02A4-8E5E-4117350DB062}"/>
+              </a:ext>
+            </a:extLst>
+          </p:cNvPr>
+          <p:cNvSpPr/>
+          <p:nvPr/>
+        </p:nvSpPr>
+        <p:spPr>
+          <a:xfrm>
+            <a:off x="459582" y="627534"/>
+            <a:ext cx="2024186" cy="720080"/>
+          </a:xfrm>
+          <a:prstGeom prst="roundRect">
+            <a:avLst/>
+          </a:prstGeom>
+        </p:spPr>
+        <p:style>
+          <a:lnRef idx="2">
+            <a:schemeClr val="accent1">
+              <a:shade val="50000"/>
+            </a:schemeClr>
+          </a:lnRef>
+          <a:fillRef idx="1">
+            <a:schemeClr val="accent1"/>
+          </a:fillRef>
+          <a:effectRef idx="0">
+            <a:schemeClr val="accent1"/>
+          </a:effectRef>
+          <a:fontRef idx="minor">
+            <a:schemeClr val="lt1"/>
+          </a:fontRef>
+        </p:style>
+        <p:txBody>
+          <a:bodyPr rtlCol="0" anchor="ctr"/>
+          <a:lstStyle/>
+          <a:p>
+            <a:pPr algn="ctr"/>
+            <a:r>
+              <a:rPr lang="en-US" dirty="0"/>
+              <a:t>Feeney’s copy (origin)</a:t>
+            </a:r>
+            <a:endParaRPr lang="en-CA" dirty="0"/>
+          </a:p>
+        </p:txBody>
+      </p:sp>
+    </p:spTree>
+    <p:extLst>
+      <p:ext uri="{BB962C8B-B14F-4D97-AF65-F5344CB8AC3E}">
+        <p14:creationId xmlns:p14="http://schemas.microsoft.com/office/powerpoint/2010/main" val="625417068"/>
+      </p:ext>
+    </p:extLst>
+  </p:cSld>
+  <p:clrMapOvr>
+    <a:masterClrMapping/>
+  </p:clrMapOvr>
+</p:sld>
+</file>
+
+<file path=ppt/slides/slide44.xml><?xml version="1.0" encoding="utf-8"?>
+<p:sld xmlns:a="http://schemas.openxmlformats.org/drawingml/2006/main" xmlns:r="http://schemas.openxmlformats.org/officeDocument/2006/relationships" xmlns:p="http://schemas.openxmlformats.org/presentationml/2006/main">
+  <p:cSld>
+    <p:spTree>
+      <p:nvGrpSpPr>
+        <p:cNvPr id="1" name=""/>
+        <p:cNvGrpSpPr/>
+        <p:nvPr/>
+      </p:nvGrpSpPr>
+      <p:grpSpPr>
+        <a:xfrm>
+          <a:off x="0" y="0"/>
+          <a:ext cx="0" cy="0"/>
+          <a:chOff x="0" y="0"/>
+          <a:chExt cx="0" cy="0"/>
+        </a:xfrm>
+      </p:grpSpPr>
+      <p:sp>
+        <p:nvSpPr>
           <p:cNvPr id="2" name="Title 1">
             <a:extLst>
               <a:ext uri="{FF2B5EF4-FFF2-40B4-BE49-F238E27FC236}">
@@ -30628,7 +31397,7 @@
 </p:sld>
 </file>
 
-<file path=ppt/slides/slide43.xml><?xml version="1.0" encoding="utf-8"?>
+<file path=ppt/slides/slide45.xml><?xml version="1.0" encoding="utf-8"?>
 <p:sld xmlns:a="http://schemas.openxmlformats.org/drawingml/2006/main" xmlns:r="http://schemas.openxmlformats.org/officeDocument/2006/relationships" xmlns:p="http://schemas.openxmlformats.org/presentationml/2006/main">
   <p:cSld>
     <p:spTree>
@@ -30900,7 +31669,7 @@
 </p:sld>
 </file>
 
-<file path=ppt/slides/slide44.xml><?xml version="1.0" encoding="utf-8"?>
+<file path=ppt/slides/slide46.xml><?xml version="1.0" encoding="utf-8"?>
 <p:sld xmlns:a="http://schemas.openxmlformats.org/drawingml/2006/main" xmlns:r="http://schemas.openxmlformats.org/officeDocument/2006/relationships" xmlns:p="http://schemas.openxmlformats.org/presentationml/2006/main">
   <p:cSld>
     <p:spTree>
@@ -31025,7 +31794,7 @@
 </p:sld>
 </file>
 
-<file path=ppt/slides/slide45.xml><?xml version="1.0" encoding="utf-8"?>
+<file path=ppt/slides/slide47.xml><?xml version="1.0" encoding="utf-8"?>
 <p:sld xmlns:a="http://schemas.openxmlformats.org/drawingml/2006/main" xmlns:r="http://schemas.openxmlformats.org/officeDocument/2006/relationships" xmlns:p="http://schemas.openxmlformats.org/presentationml/2006/main">
   <p:cSld>
     <p:spTree>

</xml_diff>

<commit_message>
Added a vector of meshes
</commit_message>
<xml_diff>
--- a/Day2Day/Day_1 (Tues, June 28th, 2022)/INFO3111S22_W01_Course_Intro (long and boring PPT).pptx
+++ b/Day2Day/Day_1 (Tues, June 28th, 2022)/INFO3111S22_W01_Course_Intro (long and boring PPT).pptx
@@ -356,7 +356,7 @@
               <a:pPr>
                 <a:defRPr/>
               </a:pPr>
-              <a:t>7/5/2022</a:t>
+              <a:t>7/7/2022</a:t>
             </a:fld>
             <a:endParaRPr lang="en-US"/>
           </a:p>
@@ -1490,7 +1490,7 @@
               <a:pPr>
                 <a:defRPr/>
               </a:pPr>
-              <a:t>7/5/2022</a:t>
+              <a:t>7/7/2022</a:t>
             </a:fld>
             <a:endParaRPr lang="en-US"/>
           </a:p>
@@ -1614,7 +1614,7 @@
               <a:pPr>
                 <a:defRPr/>
               </a:pPr>
-              <a:t>7/5/2022</a:t>
+              <a:t>7/7/2022</a:t>
             </a:fld>
             <a:endParaRPr lang="en-US" dirty="0"/>
           </a:p>
@@ -1804,7 +1804,7 @@
               <a:pPr>
                 <a:defRPr/>
               </a:pPr>
-              <a:t>7/5/2022</a:t>
+              <a:t>7/7/2022</a:t>
             </a:fld>
             <a:endParaRPr lang="en-US" dirty="0"/>
           </a:p>
@@ -2058,7 +2058,7 @@
               <a:pPr>
                 <a:defRPr/>
               </a:pPr>
-              <a:t>7/5/2022</a:t>
+              <a:t>7/7/2022</a:t>
             </a:fld>
             <a:endParaRPr lang="en-US"/>
           </a:p>
@@ -2364,7 +2364,7 @@
               <a:pPr>
                 <a:defRPr/>
               </a:pPr>
-              <a:t>7/5/2022</a:t>
+              <a:t>7/7/2022</a:t>
             </a:fld>
             <a:endParaRPr lang="en-US"/>
           </a:p>
@@ -3319,7 +3319,7 @@
               <a:pPr>
                 <a:defRPr/>
               </a:pPr>
-              <a:t>7/5/2022</a:t>
+              <a:t>7/7/2022</a:t>
             </a:fld>
             <a:endParaRPr lang="en-US"/>
           </a:p>
@@ -3471,7 +3471,7 @@
               <a:pPr>
                 <a:defRPr/>
               </a:pPr>
-              <a:t>7/5/2022</a:t>
+              <a:t>7/7/2022</a:t>
             </a:fld>
             <a:endParaRPr lang="en-US" dirty="0"/>
           </a:p>
@@ -3589,7 +3589,7 @@
               <a:pPr>
                 <a:defRPr/>
               </a:pPr>
-              <a:t>7/5/2022</a:t>
+              <a:t>7/7/2022</a:t>
             </a:fld>
             <a:endParaRPr lang="en-US"/>
           </a:p>
@@ -3867,7 +3867,7 @@
               <a:pPr>
                 <a:defRPr/>
               </a:pPr>
-              <a:t>7/5/2022</a:t>
+              <a:t>7/7/2022</a:t>
             </a:fld>
             <a:endParaRPr lang="en-US"/>
           </a:p>
@@ -4618,7 +4618,7 @@
               <a:pPr>
                 <a:defRPr/>
               </a:pPr>
-              <a:t>7/5/2022</a:t>
+              <a:t>7/7/2022</a:t>
             </a:fld>
             <a:endParaRPr lang="en-US"/>
           </a:p>
@@ -4868,7 +4868,7 @@
               <a:pPr>
                 <a:defRPr/>
               </a:pPr>
-              <a:t>7/5/2022</a:t>
+              <a:t>7/7/2022</a:t>
             </a:fld>
             <a:endParaRPr lang="en-US" dirty="0"/>
           </a:p>
@@ -30534,6 +30534,56 @@
       </p:grpSpPr>
       <p:sp>
         <p:nvSpPr>
+          <p:cNvPr id="9" name="Rectangle: Rounded Corners 8">
+            <a:extLst>
+              <a:ext uri="{FF2B5EF4-FFF2-40B4-BE49-F238E27FC236}">
+                <a16:creationId xmlns:a16="http://schemas.microsoft.com/office/drawing/2014/main" id="{A3CB8FE8-E4B1-3417-96BC-59508106B601}"/>
+              </a:ext>
+            </a:extLst>
+          </p:cNvPr>
+          <p:cNvSpPr/>
+          <p:nvPr/>
+        </p:nvSpPr>
+        <p:spPr>
+          <a:xfrm>
+            <a:off x="4692029" y="2313806"/>
+            <a:ext cx="1867718" cy="720080"/>
+          </a:xfrm>
+          <a:prstGeom prst="roundRect">
+            <a:avLst/>
+          </a:prstGeom>
+        </p:spPr>
+        <p:style>
+          <a:lnRef idx="2">
+            <a:schemeClr val="accent1">
+              <a:shade val="50000"/>
+            </a:schemeClr>
+          </a:lnRef>
+          <a:fillRef idx="1">
+            <a:schemeClr val="accent1"/>
+          </a:fillRef>
+          <a:effectRef idx="0">
+            <a:schemeClr val="accent1"/>
+          </a:effectRef>
+          <a:fontRef idx="minor">
+            <a:schemeClr val="lt1"/>
+          </a:fontRef>
+        </p:style>
+        <p:txBody>
+          <a:bodyPr rtlCol="0" anchor="ctr"/>
+          <a:lstStyle/>
+          <a:p>
+            <a:pPr algn="ctr"/>
+            <a:r>
+              <a:rPr lang="en-US" dirty="0"/>
+              <a:t>RAM 8G</a:t>
+            </a:r>
+            <a:endParaRPr lang="en-CA" dirty="0"/>
+          </a:p>
+        </p:txBody>
+      </p:sp>
+      <p:sp>
+        <p:nvSpPr>
           <p:cNvPr id="2" name="Rectangle: Rounded Corners 1">
             <a:extLst>
               <a:ext uri="{FF2B5EF4-FFF2-40B4-BE49-F238E27FC236}">
@@ -30597,7 +30647,7 @@
         <p:spPr>
           <a:xfrm>
             <a:off x="353815" y="2313806"/>
-            <a:ext cx="1867718" cy="720080"/>
+            <a:ext cx="2057945" cy="720080"/>
           </a:xfrm>
           <a:prstGeom prst="roundRect">
             <a:avLst/>
@@ -30886,56 +30936,6 @@
       </p:sp>
       <p:sp>
         <p:nvSpPr>
-          <p:cNvPr id="9" name="Rectangle: Rounded Corners 8">
-            <a:extLst>
-              <a:ext uri="{FF2B5EF4-FFF2-40B4-BE49-F238E27FC236}">
-                <a16:creationId xmlns:a16="http://schemas.microsoft.com/office/drawing/2014/main" id="{A3CB8FE8-E4B1-3417-96BC-59508106B601}"/>
-              </a:ext>
-            </a:extLst>
-          </p:cNvPr>
-          <p:cNvSpPr/>
-          <p:nvPr/>
-        </p:nvSpPr>
-        <p:spPr>
-          <a:xfrm>
-            <a:off x="4692029" y="2313806"/>
-            <a:ext cx="1867718" cy="720080"/>
-          </a:xfrm>
-          <a:prstGeom prst="roundRect">
-            <a:avLst/>
-          </a:prstGeom>
-        </p:spPr>
-        <p:style>
-          <a:lnRef idx="2">
-            <a:schemeClr val="accent1">
-              <a:shade val="50000"/>
-            </a:schemeClr>
-          </a:lnRef>
-          <a:fillRef idx="1">
-            <a:schemeClr val="accent1"/>
-          </a:fillRef>
-          <a:effectRef idx="0">
-            <a:schemeClr val="accent1"/>
-          </a:effectRef>
-          <a:fontRef idx="minor">
-            <a:schemeClr val="lt1"/>
-          </a:fontRef>
-        </p:style>
-        <p:txBody>
-          <a:bodyPr rtlCol="0" anchor="ctr"/>
-          <a:lstStyle/>
-          <a:p>
-            <a:pPr algn="ctr"/>
-            <a:r>
-              <a:rPr lang="en-US" dirty="0"/>
-              <a:t>RAM 8G</a:t>
-            </a:r>
-            <a:endParaRPr lang="en-CA" dirty="0"/>
-          </a:p>
-        </p:txBody>
-      </p:sp>
-      <p:sp>
-        <p:nvSpPr>
           <p:cNvPr id="10" name="Arrow: Up-Down 9">
             <a:extLst>
               <a:ext uri="{FF2B5EF4-FFF2-40B4-BE49-F238E27FC236}">
@@ -31051,8 +31051,8 @@
         </p:nvSpPr>
         <p:spPr>
           <a:xfrm rot="16200000">
-            <a:off x="3132745" y="1491195"/>
-            <a:ext cx="648072" cy="2437309"/>
+            <a:off x="3227860" y="1533712"/>
+            <a:ext cx="648072" cy="2280268"/>
           </a:xfrm>
           <a:prstGeom prst="upDownArrow">
             <a:avLst>

</xml_diff>